<commit_message>
Resolved error in powerpoint.
</commit_message>
<xml_diff>
--- a/Day 2 Presentation.pptx
+++ b/Day 2 Presentation.pptx
@@ -8037,7 +8037,12 @@
             <p:ph idx="1"/>
           </p:nvPr>
         </p:nvSpPr>
-        <p:spPr/>
+        <p:spPr>
+          <a:xfrm>
+            <a:off x="914400" y="1152029"/>
+            <a:ext cx="7313613" cy="4056062"/>
+          </a:xfrm>
+        </p:spPr>
         <p:txBody>
           <a:bodyPr>
             <a:normAutofit lnSpcReduction="10000"/>
@@ -9570,14 +9575,12 @@
           </a:p>
           <a:p>
             <a:r>
+              <a:rPr lang="en-US" b="1" smtClean="0"/>
+              <a:t>Automatic </a:t>
+            </a:r>
+            <a:r>
               <a:rPr lang="en-US" b="1" dirty="0" smtClean="0"/>
-              <a:t>Efficiency of Experts</a:t>
-            </a:r>
-          </a:p>
-          <a:p>
-            <a:r>
-              <a:rPr lang="en-US" b="1" dirty="0" smtClean="0"/>
-              <a:t>Automatic software updates</a:t>
+              <a:t>software updates</a:t>
             </a:r>
             <a:endParaRPr lang="en-US" dirty="0"/>
           </a:p>
@@ -9981,67 +9984,6 @@
                       </p:childTnLst>
                     </p:cTn>
                   </p:par>
-                  <p:par>
-                    <p:cTn id="33" fill="hold">
-                      <p:stCondLst>
-                        <p:cond delay="indefinite"/>
-                      </p:stCondLst>
-                      <p:childTnLst>
-                        <p:par>
-                          <p:cTn id="34" fill="hold">
-                            <p:stCondLst>
-                              <p:cond delay="0"/>
-                            </p:stCondLst>
-                            <p:childTnLst>
-                              <p:par>
-                                <p:cTn id="35" presetID="3" presetClass="entr" presetSubtype="10" fill="hold" nodeType="clickEffect">
-                                  <p:stCondLst>
-                                    <p:cond delay="0"/>
-                                  </p:stCondLst>
-                                  <p:childTnLst>
-                                    <p:set>
-                                      <p:cBhvr>
-                                        <p:cTn id="36" dur="1" fill="hold">
-                                          <p:stCondLst>
-                                            <p:cond delay="0"/>
-                                          </p:stCondLst>
-                                        </p:cTn>
-                                        <p:tgtEl>
-                                          <p:spTgt spid="3">
-                                            <p:txEl>
-                                              <p:pRg st="6" end="6"/>
-                                            </p:txEl>
-                                          </p:spTgt>
-                                        </p:tgtEl>
-                                        <p:attrNameLst>
-                                          <p:attrName>style.visibility</p:attrName>
-                                        </p:attrNameLst>
-                                      </p:cBhvr>
-                                      <p:to>
-                                        <p:strVal val="visible"/>
-                                      </p:to>
-                                    </p:set>
-                                    <p:animEffect transition="in" filter="blinds(horizontal)">
-                                      <p:cBhvr>
-                                        <p:cTn id="37" dur="500"/>
-                                        <p:tgtEl>
-                                          <p:spTgt spid="3">
-                                            <p:txEl>
-                                              <p:pRg st="6" end="6"/>
-                                            </p:txEl>
-                                          </p:spTgt>
-                                        </p:tgtEl>
-                                      </p:cBhvr>
-                                    </p:animEffect>
-                                  </p:childTnLst>
-                                </p:cTn>
-                              </p:par>
-                            </p:childTnLst>
-                          </p:cTn>
-                        </p:par>
-                      </p:childTnLst>
-                    </p:cTn>
-                  </p:par>
                 </p:childTnLst>
               </p:cTn>
               <p:prevCondLst>
@@ -10099,6 +10041,21 @@
           <a:bodyPr/>
           <a:lstStyle/>
           <a:p>
+            <a:r>
+              <a:rPr lang="en-US" dirty="0" smtClean="0"/>
+              <a:t>Benefits of </a:t>
+            </a:r>
+            <a:r>
+              <a:rPr lang="en-US" dirty="0" smtClean="0"/>
+              <a:t>C</a:t>
+            </a:r>
+            <a:r>
+              <a:rPr lang="en-US" dirty="0" smtClean="0"/>
+              <a:t>loud </a:t>
+            </a:r>
+            <a:br>
+              <a:rPr lang="en-US" dirty="0" smtClean="0"/>
+            </a:br>
             <a:r>
               <a:rPr lang="en-US" dirty="0" smtClean="0"/>
               <a:t>POV</a:t>

</xml_diff>